<commit_message>
final presentation and documentation
</commit_message>
<xml_diff>
--- a/Presentation.pptx
+++ b/Presentation.pptx
@@ -13,8 +13,8 @@
     <p:sldId id="285" r:id="rId7"/>
     <p:sldId id="287" r:id="rId8"/>
     <p:sldId id="290" r:id="rId9"/>
-    <p:sldId id="296" r:id="rId10"/>
-    <p:sldId id="288" r:id="rId11"/>
+    <p:sldId id="297" r:id="rId10"/>
+    <p:sldId id="296" r:id="rId11"/>
     <p:sldId id="295" r:id="rId12"/>
   </p:sldIdLst>
   <p:sldSz cx="12192000" cy="6858000"/>
@@ -246,7 +246,7 @@
           <a:p>
             <a:fld id="{C238102F-BFA3-4357-9FA0-3A064E6F1B5A}" type="datetimeFigureOut">
               <a:rPr lang="en-US" smtClean="0"/>
-              <a:t>2/4/2025</a:t>
+              <a:t>2/5/2025</a:t>
             </a:fld>
             <a:endParaRPr lang="en-US" dirty="0"/>
           </a:p>
@@ -853,6 +853,18 @@
   <p:clrMapOvr>
     <a:masterClrMapping/>
   </p:clrMapOvr>
+  <mc:AlternateContent xmlns:mc="http://schemas.openxmlformats.org/markup-compatibility/2006" xmlns:p15="http://schemas.microsoft.com/office/powerpoint/2012/main">
+    <mc:Choice Requires="p15">
+      <p:transition xmlns:p14="http://schemas.microsoft.com/office/powerpoint/2010/main" spd="slow" p14:dur="3250">
+        <p15:prstTrans prst="origami"/>
+      </p:transition>
+    </mc:Choice>
+    <mc:Fallback xmlns="">
+      <p:transition spd="slow">
+        <p:fade/>
+      </p:transition>
+    </mc:Fallback>
+  </mc:AlternateContent>
 </p:sldLayout>
 </file>
 
@@ -1602,6 +1614,18 @@
   <p:clrMapOvr>
     <a:masterClrMapping/>
   </p:clrMapOvr>
+  <mc:AlternateContent xmlns:mc="http://schemas.openxmlformats.org/markup-compatibility/2006" xmlns:p15="http://schemas.microsoft.com/office/powerpoint/2012/main">
+    <mc:Choice Requires="p15">
+      <p:transition xmlns:p14="http://schemas.microsoft.com/office/powerpoint/2010/main" spd="slow" p14:dur="3250">
+        <p15:prstTrans prst="origami"/>
+      </p:transition>
+    </mc:Choice>
+    <mc:Fallback xmlns="">
+      <p:transition spd="slow">
+        <p:fade/>
+      </p:transition>
+    </mc:Fallback>
+  </mc:AlternateContent>
 </p:sldLayout>
 </file>
 
@@ -2203,10 +2227,9 @@
           <a:lstStyle/>
           <a:p>
             <a:r>
-              <a:rPr lang="en-US" noProof="0" dirty="0" err="1"/>
+              <a:rPr lang="en-US" noProof="0" dirty="0"/>
               <a:t>PDFiles</a:t>
             </a:r>
-            <a:endParaRPr lang="en-US" noProof="0" dirty="0"/>
           </a:p>
         </p:txBody>
       </p:sp>
@@ -2248,6 +2271,18 @@
   <p:clrMapOvr>
     <a:masterClrMapping/>
   </p:clrMapOvr>
+  <mc:AlternateContent xmlns:mc="http://schemas.openxmlformats.org/markup-compatibility/2006" xmlns:p15="http://schemas.microsoft.com/office/powerpoint/2012/main">
+    <mc:Choice Requires="p15">
+      <p:transition xmlns:p14="http://schemas.microsoft.com/office/powerpoint/2010/main" spd="slow" p14:dur="3250">
+        <p15:prstTrans prst="origami"/>
+      </p:transition>
+    </mc:Choice>
+    <mc:Fallback xmlns="">
+      <p:transition spd="slow">
+        <p:fade/>
+      </p:transition>
+    </mc:Fallback>
+  </mc:AlternateContent>
 </p:sldLayout>
 </file>
 
@@ -2778,10 +2813,9 @@
           <a:lstStyle/>
           <a:p>
             <a:r>
-              <a:rPr lang="en-US" noProof="0" dirty="0" err="1"/>
+              <a:rPr lang="en-US" noProof="0" dirty="0"/>
               <a:t>PDFiles</a:t>
             </a:r>
-            <a:endParaRPr lang="en-US" noProof="0" dirty="0"/>
           </a:p>
         </p:txBody>
       </p:sp>
@@ -2823,6 +2857,18 @@
   <p:clrMapOvr>
     <a:masterClrMapping/>
   </p:clrMapOvr>
+  <mc:AlternateContent xmlns:mc="http://schemas.openxmlformats.org/markup-compatibility/2006" xmlns:p15="http://schemas.microsoft.com/office/powerpoint/2012/main">
+    <mc:Choice Requires="p15">
+      <p:transition xmlns:p14="http://schemas.microsoft.com/office/powerpoint/2010/main" spd="slow" p14:dur="3250">
+        <p15:prstTrans prst="origami"/>
+      </p:transition>
+    </mc:Choice>
+    <mc:Fallback xmlns="">
+      <p:transition spd="slow">
+        <p:fade/>
+      </p:transition>
+    </mc:Fallback>
+  </mc:AlternateContent>
 </p:sldLayout>
 </file>
 
@@ -3564,10 +3610,9 @@
           <a:lstStyle/>
           <a:p>
             <a:r>
-              <a:rPr lang="en-US" noProof="0" dirty="0" err="1"/>
+              <a:rPr lang="en-US" noProof="0" dirty="0"/>
               <a:t>PDFiles</a:t>
             </a:r>
-            <a:endParaRPr lang="en-US" noProof="0" dirty="0"/>
           </a:p>
         </p:txBody>
       </p:sp>
@@ -3609,6 +3654,18 @@
   <p:clrMapOvr>
     <a:masterClrMapping/>
   </p:clrMapOvr>
+  <mc:AlternateContent xmlns:mc="http://schemas.openxmlformats.org/markup-compatibility/2006" xmlns:p15="http://schemas.microsoft.com/office/powerpoint/2012/main">
+    <mc:Choice Requires="p15">
+      <p:transition xmlns:p14="http://schemas.microsoft.com/office/powerpoint/2010/main" spd="slow" p14:dur="3250">
+        <p15:prstTrans prst="origami"/>
+      </p:transition>
+    </mc:Choice>
+    <mc:Fallback xmlns="">
+      <p:transition spd="slow">
+        <p:fade/>
+      </p:transition>
+    </mc:Fallback>
+  </mc:AlternateContent>
 </p:sldLayout>
 </file>
 
@@ -4026,6 +4083,18 @@
   <p:clrMapOvr>
     <a:masterClrMapping/>
   </p:clrMapOvr>
+  <mc:AlternateContent xmlns:mc="http://schemas.openxmlformats.org/markup-compatibility/2006" xmlns:p15="http://schemas.microsoft.com/office/powerpoint/2012/main">
+    <mc:Choice Requires="p15">
+      <p:transition xmlns:p14="http://schemas.microsoft.com/office/powerpoint/2010/main" spd="slow" p14:dur="3250">
+        <p15:prstTrans prst="origami"/>
+      </p:transition>
+    </mc:Choice>
+    <mc:Fallback xmlns="">
+      <p:transition spd="slow">
+        <p:fade/>
+      </p:transition>
+    </mc:Fallback>
+  </mc:AlternateContent>
 </p:sldLayout>
 </file>
 
@@ -4369,6 +4438,18 @@
   <p:clrMapOvr>
     <a:masterClrMapping/>
   </p:clrMapOvr>
+  <mc:AlternateContent xmlns:mc="http://schemas.openxmlformats.org/markup-compatibility/2006" xmlns:p15="http://schemas.microsoft.com/office/powerpoint/2012/main">
+    <mc:Choice Requires="p15">
+      <p:transition xmlns:p14="http://schemas.microsoft.com/office/powerpoint/2010/main" spd="slow" p14:dur="3250">
+        <p15:prstTrans prst="origami"/>
+      </p:transition>
+    </mc:Choice>
+    <mc:Fallback xmlns="">
+      <p:transition spd="slow">
+        <p:fade/>
+      </p:transition>
+    </mc:Fallback>
+  </mc:AlternateContent>
 </p:sldLayout>
 </file>
 
@@ -4476,10 +4557,9 @@
           <a:lstStyle/>
           <a:p>
             <a:r>
-              <a:rPr lang="en-US" noProof="0" dirty="0" err="1"/>
+              <a:rPr lang="en-US" noProof="0" dirty="0"/>
               <a:t>PDFiles</a:t>
             </a:r>
-            <a:endParaRPr lang="en-US" noProof="0" dirty="0"/>
           </a:p>
         </p:txBody>
       </p:sp>
@@ -4521,6 +4601,18 @@
   <p:clrMapOvr>
     <a:masterClrMapping/>
   </p:clrMapOvr>
+  <mc:AlternateContent xmlns:mc="http://schemas.openxmlformats.org/markup-compatibility/2006" xmlns:p15="http://schemas.microsoft.com/office/powerpoint/2012/main">
+    <mc:Choice Requires="p15">
+      <p:transition xmlns:p14="http://schemas.microsoft.com/office/powerpoint/2010/main" spd="slow" p14:dur="3250">
+        <p15:prstTrans prst="origami"/>
+      </p:transition>
+    </mc:Choice>
+    <mc:Fallback xmlns="">
+      <p:transition spd="slow">
+        <p:fade/>
+      </p:transition>
+    </mc:Fallback>
+  </mc:AlternateContent>
 </p:sldLayout>
 </file>
 
@@ -4600,10 +4692,9 @@
           <a:lstStyle/>
           <a:p>
             <a:r>
-              <a:rPr lang="en-US" noProof="0" dirty="0" err="1"/>
+              <a:rPr lang="en-US" noProof="0" dirty="0"/>
               <a:t>PDFiles</a:t>
             </a:r>
-            <a:endParaRPr lang="en-US" noProof="0" dirty="0"/>
           </a:p>
         </p:txBody>
       </p:sp>
@@ -4645,6 +4736,18 @@
   <p:clrMapOvr>
     <a:masterClrMapping/>
   </p:clrMapOvr>
+  <mc:AlternateContent xmlns:mc="http://schemas.openxmlformats.org/markup-compatibility/2006" xmlns:p15="http://schemas.microsoft.com/office/powerpoint/2012/main">
+    <mc:Choice Requires="p15">
+      <p:transition xmlns:p14="http://schemas.microsoft.com/office/powerpoint/2010/main" spd="slow" p14:dur="3250">
+        <p15:prstTrans prst="origami"/>
+      </p:transition>
+    </mc:Choice>
+    <mc:Fallback xmlns="">
+      <p:transition spd="slow">
+        <p:fade/>
+      </p:transition>
+    </mc:Fallback>
+  </mc:AlternateContent>
 </p:sldLayout>
 </file>
 
@@ -5577,10 +5680,9 @@
           <a:lstStyle/>
           <a:p>
             <a:r>
-              <a:rPr lang="en-US" noProof="0" dirty="0" err="1"/>
+              <a:rPr lang="en-US" noProof="0" dirty="0"/>
               <a:t>PDFiles</a:t>
             </a:r>
-            <a:endParaRPr lang="en-US" noProof="0" dirty="0"/>
           </a:p>
         </p:txBody>
       </p:sp>
@@ -5622,6 +5724,18 @@
   <p:clrMapOvr>
     <a:masterClrMapping/>
   </p:clrMapOvr>
+  <mc:AlternateContent xmlns:mc="http://schemas.openxmlformats.org/markup-compatibility/2006" xmlns:p15="http://schemas.microsoft.com/office/powerpoint/2012/main">
+    <mc:Choice Requires="p15">
+      <p:transition xmlns:p14="http://schemas.microsoft.com/office/powerpoint/2010/main" spd="slow" p14:dur="3250">
+        <p15:prstTrans prst="origami"/>
+      </p:transition>
+    </mc:Choice>
+    <mc:Fallback xmlns="">
+      <p:transition spd="slow">
+        <p:fade/>
+      </p:transition>
+    </mc:Fallback>
+  </mc:AlternateContent>
 </p:sldLayout>
 </file>
 
@@ -6111,6 +6225,18 @@
   <p:clrMapOvr>
     <a:masterClrMapping/>
   </p:clrMapOvr>
+  <mc:AlternateContent xmlns:mc="http://schemas.openxmlformats.org/markup-compatibility/2006" xmlns:p15="http://schemas.microsoft.com/office/powerpoint/2012/main">
+    <mc:Choice Requires="p15">
+      <p:transition xmlns:p14="http://schemas.microsoft.com/office/powerpoint/2010/main" spd="slow" p14:dur="3250">
+        <p15:prstTrans prst="origami"/>
+      </p:transition>
+    </mc:Choice>
+    <mc:Fallback xmlns="">
+      <p:transition spd="slow">
+        <p:fade/>
+      </p:transition>
+    </mc:Fallback>
+  </mc:AlternateContent>
 </p:sldLayout>
 </file>
 
@@ -6424,6 +6550,18 @@
   <p:clrMapOvr>
     <a:masterClrMapping/>
   </p:clrMapOvr>
+  <mc:AlternateContent xmlns:mc="http://schemas.openxmlformats.org/markup-compatibility/2006" xmlns:p15="http://schemas.microsoft.com/office/powerpoint/2012/main">
+    <mc:Choice Requires="p15">
+      <p:transition xmlns:p14="http://schemas.microsoft.com/office/powerpoint/2010/main" spd="slow" p14:dur="3250">
+        <p15:prstTrans prst="origami"/>
+      </p:transition>
+    </mc:Choice>
+    <mc:Fallback xmlns="">
+      <p:transition spd="slow">
+        <p:fade/>
+      </p:transition>
+    </mc:Fallback>
+  </mc:AlternateContent>
 </p:sldLayout>
 </file>
 
@@ -6593,10 +6731,9 @@
           <a:lstStyle/>
           <a:p>
             <a:r>
-              <a:rPr lang="en-US" noProof="0" dirty="0" err="1"/>
+              <a:rPr lang="en-US" noProof="0" dirty="0"/>
               <a:t>PDFiles</a:t>
             </a:r>
-            <a:endParaRPr lang="en-US" noProof="0" dirty="0"/>
           </a:p>
         </p:txBody>
       </p:sp>
@@ -6638,6 +6775,18 @@
   <p:clrMapOvr>
     <a:masterClrMapping/>
   </p:clrMapOvr>
+  <mc:AlternateContent xmlns:mc="http://schemas.openxmlformats.org/markup-compatibility/2006" xmlns:p15="http://schemas.microsoft.com/office/powerpoint/2012/main">
+    <mc:Choice Requires="p15">
+      <p:transition xmlns:p14="http://schemas.microsoft.com/office/powerpoint/2010/main" spd="slow" p14:dur="3250">
+        <p15:prstTrans prst="origami"/>
+      </p:transition>
+    </mc:Choice>
+    <mc:Fallback xmlns="">
+      <p:transition spd="slow">
+        <p:fade/>
+      </p:transition>
+    </mc:Fallback>
+  </mc:AlternateContent>
 </p:sldLayout>
 </file>
 
@@ -7012,10 +7161,9 @@
           <a:lstStyle/>
           <a:p>
             <a:r>
-              <a:rPr lang="en-US" noProof="0" dirty="0" err="1"/>
+              <a:rPr lang="en-US" noProof="0" dirty="0"/>
               <a:t>PDFiles</a:t>
             </a:r>
-            <a:endParaRPr lang="en-US" noProof="0" dirty="0"/>
           </a:p>
         </p:txBody>
       </p:sp>
@@ -7059,6 +7207,18 @@
   <p:clrMapOvr>
     <a:masterClrMapping/>
   </p:clrMapOvr>
+  <mc:AlternateContent xmlns:mc="http://schemas.openxmlformats.org/markup-compatibility/2006" xmlns:p15="http://schemas.microsoft.com/office/powerpoint/2012/main">
+    <mc:Choice Requires="p15">
+      <p:transition xmlns:p14="http://schemas.microsoft.com/office/powerpoint/2010/main" spd="slow" p14:dur="3250">
+        <p15:prstTrans prst="origami"/>
+      </p:transition>
+    </mc:Choice>
+    <mc:Fallback xmlns="">
+      <p:transition spd="slow">
+        <p:fade/>
+      </p:transition>
+    </mc:Fallback>
+  </mc:AlternateContent>
 </p:sldLayout>
 </file>
 
@@ -8155,10 +8315,9 @@
           </a:lstStyle>
           <a:p>
             <a:r>
-              <a:rPr lang="en-US" noProof="0" dirty="0" err="1"/>
+              <a:rPr lang="en-US" noProof="0" dirty="0"/>
               <a:t>PDFiles</a:t>
             </a:r>
-            <a:endParaRPr lang="en-US" noProof="0" dirty="0"/>
           </a:p>
         </p:txBody>
       </p:sp>
@@ -8208,6 +8367,18 @@
   <p:clrMapOvr>
     <a:masterClrMapping/>
   </p:clrMapOvr>
+  <mc:AlternateContent xmlns:mc="http://schemas.openxmlformats.org/markup-compatibility/2006" xmlns:p15="http://schemas.microsoft.com/office/powerpoint/2012/main">
+    <mc:Choice Requires="p15">
+      <p:transition xmlns:p14="http://schemas.microsoft.com/office/powerpoint/2010/main" spd="slow" p14:dur="3250">
+        <p15:prstTrans prst="origami"/>
+      </p:transition>
+    </mc:Choice>
+    <mc:Fallback xmlns="">
+      <p:transition spd="slow">
+        <p:fade/>
+      </p:transition>
+    </mc:Fallback>
+  </mc:AlternateContent>
 </p:sldLayout>
 </file>
 
@@ -9818,6 +9989,18 @@
   <p:clrMapOvr>
     <a:masterClrMapping/>
   </p:clrMapOvr>
+  <mc:AlternateContent xmlns:mc="http://schemas.openxmlformats.org/markup-compatibility/2006" xmlns:p15="http://schemas.microsoft.com/office/powerpoint/2012/main">
+    <mc:Choice Requires="p15">
+      <p:transition xmlns:p14="http://schemas.microsoft.com/office/powerpoint/2010/main" spd="slow" p14:dur="3250">
+        <p15:prstTrans prst="origami"/>
+      </p:transition>
+    </mc:Choice>
+    <mc:Fallback xmlns="">
+      <p:transition spd="slow">
+        <p:fade/>
+      </p:transition>
+    </mc:Fallback>
+  </mc:AlternateContent>
 </p:sldLayout>
 </file>
 
@@ -11693,6 +11876,18 @@
   <p:clrMapOvr>
     <a:masterClrMapping/>
   </p:clrMapOvr>
+  <mc:AlternateContent xmlns:mc="http://schemas.openxmlformats.org/markup-compatibility/2006" xmlns:p15="http://schemas.microsoft.com/office/powerpoint/2012/main">
+    <mc:Choice Requires="p15">
+      <p:transition xmlns:p14="http://schemas.microsoft.com/office/powerpoint/2010/main" spd="slow" p14:dur="3250">
+        <p15:prstTrans prst="origami"/>
+      </p:transition>
+    </mc:Choice>
+    <mc:Fallback xmlns="">
+      <p:transition spd="slow">
+        <p:fade/>
+      </p:transition>
+    </mc:Fallback>
+  </mc:AlternateContent>
 </p:sldLayout>
 </file>
 
@@ -11912,10 +12107,9 @@
           </a:lstStyle>
           <a:p>
             <a:r>
-              <a:rPr lang="en-US" dirty="0" err="1"/>
+              <a:rPr lang="en-US" dirty="0"/>
               <a:t>PDFiles</a:t>
             </a:r>
-            <a:endParaRPr lang="en-US" dirty="0"/>
           </a:p>
         </p:txBody>
       </p:sp>
@@ -12167,6 +12361,18 @@
     <p:sldLayoutId id="2147483654" r:id="rId16"/>
     <p:sldLayoutId id="2147483655" r:id="rId17"/>
   </p:sldLayoutIdLst>
+  <mc:AlternateContent xmlns:mc="http://schemas.openxmlformats.org/markup-compatibility/2006" xmlns:p15="http://schemas.microsoft.com/office/powerpoint/2012/main">
+    <mc:Choice Requires="p15">
+      <p:transition xmlns:p14="http://schemas.microsoft.com/office/powerpoint/2010/main" spd="slow" p14:dur="3250">
+        <p15:prstTrans prst="origami"/>
+      </p:transition>
+    </mc:Choice>
+    <mc:Fallback xmlns="">
+      <p:transition spd="slow">
+        <p:fade/>
+      </p:transition>
+    </mc:Fallback>
+  </mc:AlternateContent>
   <p:hf hdr="0"/>
   <p:txStyles>
     <p:titleStyle>
@@ -12495,10 +12701,16 @@
           <a:lstStyle/>
           <a:p>
             <a:r>
-              <a:rPr lang="en-US" dirty="0" err="1"/>
+              <a:rPr lang="en-US" dirty="0"/>
               <a:t>PDFiles</a:t>
             </a:r>
-            <a:endParaRPr lang="en-US" dirty="0"/>
+            <a:br>
+              <a:rPr lang="en-US" dirty="0"/>
+            </a:br>
+            <a:r>
+              <a:rPr lang="en-US" sz="3600" dirty="0"/>
+              <a:t>Project Presentation</a:t>
+            </a:r>
           </a:p>
         </p:txBody>
       </p:sp>
@@ -12529,18 +12741,24 @@
           <a:lstStyle/>
           <a:p>
             <a:r>
-              <a:rPr lang="en-US" sz="2400" dirty="0"/>
-              <a:t>Abyaz, Abbas, Kenz &amp; Sahil</a:t>
-            </a:r>
-          </a:p>
-          <a:p>
-            <a:endParaRPr lang="en-US" dirty="0"/>
-          </a:p>
-          <a:p>
-            <a:endParaRPr lang="en-US" dirty="0"/>
-          </a:p>
-          <a:p>
-            <a:endParaRPr lang="en-US" dirty="0"/>
+              <a:rPr lang="en-US" sz="2400" b="1" dirty="0"/>
+              <a:t>Group 3</a:t>
+            </a:r>
+          </a:p>
+          <a:p>
+            <a:r>
+              <a:rPr lang="en-US" sz="2400" b="1" dirty="0"/>
+              <a:t>Abyaz, Abbas, Kenz, and Sahil</a:t>
+            </a:r>
+          </a:p>
+          <a:p>
+            <a:endParaRPr lang="en-US" b="1" dirty="0"/>
+          </a:p>
+          <a:p>
+            <a:endParaRPr lang="en-US" b="1" dirty="0"/>
+          </a:p>
+          <a:p>
+            <a:endParaRPr lang="en-US" b="1" dirty="0"/>
           </a:p>
         </p:txBody>
       </p:sp>
@@ -12736,35 +12954,6 @@
             </a:lvl9pPr>
           </a:lstStyle>
           <a:p>
-            <a:r>
-              <a:rPr lang="en-US" sz="1400" dirty="0" err="1"/>
-              <a:t>i</a:t>
-            </a:r>
-            <a:r>
-              <a:rPr lang="en-US" sz="1400" dirty="0"/>
-              <a:t> stole this </a:t>
-            </a:r>
-            <a:r>
-              <a:rPr lang="en-US" sz="1400" dirty="0" err="1"/>
-              <a:t>powerpoint</a:t>
-            </a:r>
-            <a:r>
-              <a:rPr lang="en-US" sz="1400" dirty="0"/>
-              <a:t> template, ignore the </a:t>
-            </a:r>
-            <a:r>
-              <a:rPr lang="en-US" sz="1400" dirty="0" err="1"/>
-              <a:t>imgs</a:t>
-            </a:r>
-            <a:r>
-              <a:rPr lang="en-US" sz="1400" dirty="0"/>
-              <a:t> :)</a:t>
-            </a:r>
-          </a:p>
-          <a:p>
-            <a:endParaRPr lang="en-US" dirty="0"/>
-          </a:p>
-          <a:p>
             <a:endParaRPr lang="en-US" dirty="0"/>
           </a:p>
         </p:txBody>
@@ -12779,6 +12968,18 @@
   <p:clrMapOvr>
     <a:masterClrMapping/>
   </p:clrMapOvr>
+  <mc:AlternateContent xmlns:mc="http://schemas.openxmlformats.org/markup-compatibility/2006" xmlns:p14="http://schemas.microsoft.com/office/powerpoint/2010/main">
+    <mc:Choice Requires="p14">
+      <p:transition spd="slow" p14:dur="8000">
+        <p14:vortex dir="r"/>
+      </p:transition>
+    </mc:Choice>
+    <mc:Fallback xmlns="">
+      <p:transition spd="slow">
+        <p:fade/>
+      </p:transition>
+    </mc:Fallback>
+  </mc:AlternateContent>
 </p:sld>
 </file>
 
@@ -12822,7 +13023,7 @@
           <a:p>
             <a:r>
               <a:rPr lang="en-US" dirty="0"/>
-              <a:t>Idk what to put here</a:t>
+              <a:t>Presentation Outline</a:t>
             </a:r>
           </a:p>
         </p:txBody>
@@ -13021,13 +13222,13 @@
           <a:p>
             <a:r>
               <a:rPr lang="en-US" dirty="0"/>
-              <a:t>Meet our</a:t>
+              <a:t>Meet Our</a:t>
             </a:r>
           </a:p>
           <a:p>
             <a:r>
               <a:rPr lang="en-US" dirty="0"/>
-              <a:t>team</a:t>
+              <a:t>Team</a:t>
             </a:r>
           </a:p>
         </p:txBody>
@@ -13177,10 +13378,9 @@
           <a:lstStyle/>
           <a:p>
             <a:r>
-              <a:rPr lang="en-US" dirty="0" err="1"/>
+              <a:rPr lang="en-US" dirty="0"/>
               <a:t>PDFiles</a:t>
             </a:r>
-            <a:endParaRPr lang="en-US" dirty="0"/>
           </a:p>
         </p:txBody>
       </p:sp>
@@ -13222,6 +13422,18 @@
   <p:clrMapOvr>
     <a:masterClrMapping/>
   </p:clrMapOvr>
+  <mc:AlternateContent xmlns:mc="http://schemas.openxmlformats.org/markup-compatibility/2006" xmlns:p15="http://schemas.microsoft.com/office/powerpoint/2012/main">
+    <mc:Choice Requires="p15">
+      <p:transition xmlns:p14="http://schemas.microsoft.com/office/powerpoint/2010/main" spd="slow" p14:dur="3250">
+        <p15:prstTrans prst="origami"/>
+      </p:transition>
+    </mc:Choice>
+    <mc:Fallback xmlns="">
+      <p:transition spd="slow">
+        <p:fade/>
+      </p:transition>
+    </mc:Fallback>
+  </mc:AlternateContent>
 </p:sld>
 </file>
 
@@ -13308,6 +13520,18 @@
   <p:clrMapOvr>
     <a:masterClrMapping/>
   </p:clrMapOvr>
+  <mc:AlternateContent xmlns:mc="http://schemas.openxmlformats.org/markup-compatibility/2006" xmlns:p15="http://schemas.microsoft.com/office/powerpoint/2012/main">
+    <mc:Choice Requires="p15">
+      <p:transition xmlns:p14="http://schemas.microsoft.com/office/powerpoint/2010/main" spd="slow" p14:dur="3250">
+        <p15:prstTrans prst="origami"/>
+      </p:transition>
+    </mc:Choice>
+    <mc:Fallback xmlns="">
+      <p:transition spd="slow">
+        <p:fade/>
+      </p:transition>
+    </mc:Fallback>
+  </mc:AlternateContent>
 </p:sld>
 </file>
 
@@ -13364,15 +13588,7 @@
             </a:r>
             <a:r>
               <a:rPr lang="en-US" dirty="0"/>
-              <a:t> is </a:t>
-            </a:r>
-            <a:r>
-              <a:rPr lang="en-US" dirty="0" err="1"/>
-              <a:t>PDFiles</a:t>
-            </a:r>
-            <a:r>
-              <a:rPr lang="en-US" dirty="0"/>
-              <a:t>?</a:t>
+              <a:t> is PDFiles?</a:t>
             </a:r>
           </a:p>
         </p:txBody>
@@ -13403,11 +13619,20 @@
           <a:bodyPr/>
           <a:lstStyle/>
           <a:p>
-            <a:pPr marR="0"/>
-            <a:r>
-              <a:rPr lang="en-US" sz="2000" dirty="0"/>
-              <a:t>It is a PDF tool which makes working with PDF files easier by allowing users to merge &amp; split. It's designed to be simple and easy to use, helping people quickly manage their PDFs without any hassle.</a:t>
-            </a:r>
+            <a:pPr marL="0" marR="0"/>
+            <a:r>
+              <a:rPr lang="en-US" sz="1800" dirty="0">
+                <a:effectLst/>
+                <a:latin typeface="Tahoma" panose="020B0604030504040204" pitchFamily="34" charset="0"/>
+                <a:ea typeface="Lucida Sans Unicode" panose="020B0602030504020204" pitchFamily="34" charset="0"/>
+              </a:rPr>
+              <a:t>This PDF tool streamlines the management of PDF files by enabling users to efficiently split and merge documents, tasks that are frequently required. Designed with simplicity and ease of use in mind, it allows users to handle their PDFs quickly and without hassle.</a:t>
+            </a:r>
+            <a:endParaRPr lang="en-US" sz="1800" dirty="0">
+              <a:effectLst/>
+              <a:latin typeface="Lucida Sans Unicode" panose="020B0602030504020204" pitchFamily="34" charset="0"/>
+              <a:ea typeface="Lucida Sans Unicode" panose="020B0602030504020204" pitchFamily="34" charset="0"/>
+            </a:endParaRPr>
           </a:p>
         </p:txBody>
       </p:sp>
@@ -13479,6 +13704,18 @@
   <p:clrMapOvr>
     <a:masterClrMapping/>
   </p:clrMapOvr>
+  <mc:AlternateContent xmlns:mc="http://schemas.openxmlformats.org/markup-compatibility/2006" xmlns:p15="http://schemas.microsoft.com/office/powerpoint/2012/main">
+    <mc:Choice Requires="p15">
+      <p:transition xmlns:p14="http://schemas.microsoft.com/office/powerpoint/2010/main" spd="slow" p14:dur="3250">
+        <p15:prstTrans prst="origami"/>
+      </p:transition>
+    </mc:Choice>
+    <mc:Fallback xmlns="">
+      <p:transition spd="slow">
+        <p:fade/>
+      </p:transition>
+    </mc:Fallback>
+  </mc:AlternateContent>
 </p:sld>
 </file>
 
@@ -13522,7 +13759,7 @@
           <a:p>
             <a:r>
               <a:rPr lang="en-US" dirty="0"/>
-              <a:t>Meet our team</a:t>
+              <a:t>Meet Our Team</a:t>
             </a:r>
           </a:p>
         </p:txBody>
@@ -13571,14 +13808,19 @@
             <p:ph type="body" sz="quarter" idx="15"/>
           </p:nvPr>
         </p:nvSpPr>
-        <p:spPr/>
+        <p:spPr>
+          <a:xfrm>
+            <a:off x="580220" y="4929071"/>
+            <a:ext cx="2514600" cy="338328"/>
+          </a:xfrm>
+        </p:spPr>
         <p:txBody>
           <a:bodyPr/>
           <a:lstStyle/>
           <a:p>
             <a:r>
               <a:rPr lang="en-US" dirty="0"/>
-              <a:t>team leader</a:t>
+              <a:t>Team Leader</a:t>
             </a:r>
           </a:p>
         </p:txBody>
@@ -13627,14 +13869,19 @@
             <p:ph type="body" sz="quarter" idx="18"/>
           </p:nvPr>
         </p:nvSpPr>
-        <p:spPr/>
+        <p:spPr>
+          <a:xfrm>
+            <a:off x="3419856" y="4924927"/>
+            <a:ext cx="2514600" cy="338328"/>
+          </a:xfrm>
+        </p:spPr>
         <p:txBody>
           <a:bodyPr/>
           <a:lstStyle/>
           <a:p>
             <a:r>
               <a:rPr lang="en-US" dirty="0"/>
-              <a:t>backend</a:t>
+              <a:t>Backend</a:t>
             </a:r>
           </a:p>
         </p:txBody>
@@ -13683,14 +13930,19 @@
             <p:ph type="body" sz="quarter" idx="21"/>
           </p:nvPr>
         </p:nvSpPr>
-        <p:spPr/>
+        <p:spPr>
+          <a:xfrm>
+            <a:off x="6273896" y="4929071"/>
+            <a:ext cx="2514600" cy="338328"/>
+          </a:xfrm>
+        </p:spPr>
         <p:txBody>
           <a:bodyPr/>
           <a:lstStyle/>
           <a:p>
             <a:r>
               <a:rPr lang="en-US" dirty="0"/>
-              <a:t>frontend &amp; backend</a:t>
+              <a:t>Frontend &amp; Backend</a:t>
             </a:r>
           </a:p>
         </p:txBody>
@@ -13739,20 +13991,20 @@
             <p:ph type="body" sz="quarter" idx="24"/>
           </p:nvPr>
         </p:nvSpPr>
-        <p:spPr/>
+        <p:spPr>
+          <a:xfrm>
+            <a:off x="9509338" y="4799317"/>
+            <a:ext cx="1707969" cy="338328"/>
+          </a:xfrm>
+        </p:spPr>
         <p:txBody>
           <a:bodyPr/>
           <a:lstStyle/>
           <a:p>
             <a:r>
-              <a:rPr lang="en-US" dirty="0"/>
-              <a:t>emotional support </a:t>
-            </a:r>
-            <a:r>
-              <a:rPr lang="en-US" sz="2000" dirty="0"/>
-              <a:t>:P</a:t>
-            </a:r>
-            <a:endParaRPr lang="en-US" dirty="0"/>
+              <a:rPr lang="en-US" sz="1400" dirty="0"/>
+              <a:t>Backend &amp; Interface Design Concept</a:t>
+            </a:r>
           </a:p>
         </p:txBody>
       </p:sp>
@@ -13808,10 +14060,9 @@
           <a:lstStyle/>
           <a:p>
             <a:r>
-              <a:rPr lang="en-US" dirty="0" err="1"/>
+              <a:rPr lang="en-US" dirty="0"/>
               <a:t>PDFiles</a:t>
             </a:r>
-            <a:endParaRPr lang="en-US" dirty="0"/>
           </a:p>
         </p:txBody>
       </p:sp>
@@ -13958,6 +14209,18 @@
   <p:clrMapOvr>
     <a:masterClrMapping/>
   </p:clrMapOvr>
+  <mc:AlternateContent xmlns:mc="http://schemas.openxmlformats.org/markup-compatibility/2006" xmlns:p15="http://schemas.microsoft.com/office/powerpoint/2012/main">
+    <mc:Choice Requires="p15">
+      <p:transition xmlns:p14="http://schemas.microsoft.com/office/powerpoint/2010/main" spd="slow" p14:dur="3250">
+        <p15:prstTrans prst="origami"/>
+      </p:transition>
+    </mc:Choice>
+    <mc:Fallback xmlns="">
+      <p:transition spd="slow">
+        <p:fade/>
+      </p:transition>
+    </mc:Fallback>
+  </mc:AlternateContent>
 </p:sld>
 </file>
 
@@ -13983,7 +14246,7 @@
           <p:cNvPr id="2" name="Title 1">
             <a:extLst>
               <a:ext uri="{FF2B5EF4-FFF2-40B4-BE49-F238E27FC236}">
-                <a16:creationId xmlns:a16="http://schemas.microsoft.com/office/drawing/2014/main" id="{C3245750-778C-26A4-693A-9F7698202DCC}"/>
+                <a16:creationId xmlns:a16="http://schemas.microsoft.com/office/drawing/2014/main" id="{277CCB4C-9259-6B29-6B9C-93EF34FAFFB9}"/>
               </a:ext>
             </a:extLst>
           </p:cNvPr>
@@ -13994,68 +14257,812 @@
             <p:ph type="title"/>
           </p:nvPr>
         </p:nvSpPr>
-        <p:spPr>
-          <a:xfrm>
-            <a:off x="677089" y="1947672"/>
-            <a:ext cx="3873137" cy="3767328"/>
-          </a:xfrm>
-        </p:spPr>
+        <p:spPr/>
         <p:txBody>
           <a:bodyPr/>
           <a:lstStyle/>
           <a:p>
             <a:r>
+              <a:rPr lang="en-US" b="0" i="0" dirty="0">
+                <a:solidFill>
+                  <a:srgbClr val="FFFFFF"/>
+                </a:solidFill>
+                <a:effectLst/>
+              </a:rPr>
+              <a:t>Key </a:t>
+            </a:r>
+            <a:r>
+              <a:rPr lang="en-US" sz="5400" dirty="0"/>
+              <a:t>Advantages</a:t>
+            </a:r>
+            <a:r>
               <a:rPr lang="en-US" dirty="0"/>
-              <a:t>Code Review</a:t>
-            </a:r>
-            <a:br>
-              <a:rPr lang="en-US" dirty="0"/>
-            </a:br>
-            <a:r>
-              <a:rPr lang="en-US" dirty="0"/>
-              <a:t>+ Demo</a:t>
-            </a:r>
-          </a:p>
-        </p:txBody>
-      </p:sp>
-      <p:sp>
-        <p:nvSpPr>
-          <p:cNvPr id="4" name="Picture Placeholder 3">
-            <a:extLst>
-              <a:ext uri="{FF2B5EF4-FFF2-40B4-BE49-F238E27FC236}">
-                <a16:creationId xmlns:a16="http://schemas.microsoft.com/office/drawing/2014/main" id="{EE4315CC-1D7C-4915-CFFA-A31DFEDA674A}"/>
-              </a:ext>
-            </a:extLst>
-          </p:cNvPr>
-          <p:cNvSpPr>
-            <a:spLocks noGrp="1"/>
-          </p:cNvSpPr>
-          <p:nvPr>
-            <p:ph type="pic" sz="quarter" idx="10"/>
-          </p:nvPr>
-        </p:nvSpPr>
-        <p:spPr/>
+              <a:t> of PDFiles</a:t>
+            </a:r>
+          </a:p>
+        </p:txBody>
+      </p:sp>
+      <p:sp>
+        <p:nvSpPr>
+          <p:cNvPr id="5" name="Text Placeholder 4">
+            <a:extLst>
+              <a:ext uri="{FF2B5EF4-FFF2-40B4-BE49-F238E27FC236}">
+                <a16:creationId xmlns:a16="http://schemas.microsoft.com/office/drawing/2014/main" id="{6FD38951-E836-CDDB-1011-A035C2C04D54}"/>
+              </a:ext>
+            </a:extLst>
+          </p:cNvPr>
+          <p:cNvSpPr>
+            <a:spLocks noGrp="1"/>
+          </p:cNvSpPr>
+          <p:nvPr>
+            <p:ph type="body" sz="quarter" idx="15"/>
+          </p:nvPr>
+        </p:nvSpPr>
+        <p:spPr>
+          <a:xfrm>
+            <a:off x="740229" y="2383971"/>
+            <a:ext cx="2514600" cy="3009471"/>
+          </a:xfrm>
+        </p:spPr>
         <p:txBody>
           <a:bodyPr/>
           <a:lstStyle/>
           <a:p>
             <a:r>
-              <a:rPr lang="en-US" dirty="0"/>
-              <a:t>Click icon to add a picture</a:t>
-            </a:r>
+              <a:rPr lang="en-US" sz="2000" b="1" u="sng" dirty="0"/>
+              <a:t>Fast and Lightweight:</a:t>
+            </a:r>
+          </a:p>
+          <a:p>
+            <a:r>
+              <a:rPr lang="en-US" sz="2000" dirty="0"/>
+              <a:t>This tool can operate seamlessly on any machine. It can split up to </a:t>
+            </a:r>
+            <a:r>
+              <a:rPr lang="en-US" sz="2000" b="1" dirty="0"/>
+              <a:t>1,400 pages/sec</a:t>
+            </a:r>
+            <a:r>
+              <a:rPr lang="en-US" sz="2000" dirty="0"/>
+              <a:t> and merge </a:t>
+            </a:r>
+            <a:r>
+              <a:rPr lang="en-US" sz="2000" b="1" dirty="0"/>
+              <a:t>650 pages/sec</a:t>
+            </a:r>
+            <a:r>
+              <a:rPr lang="en-US" sz="2000" dirty="0"/>
+              <a:t> on mediocre hardware, ensuring more-than-necessary performance</a:t>
+            </a:r>
+            <a:r>
+              <a:rPr lang="en-US" sz="1800" dirty="0"/>
+              <a:t>. </a:t>
+            </a:r>
+          </a:p>
+        </p:txBody>
+      </p:sp>
+      <p:sp>
+        <p:nvSpPr>
+          <p:cNvPr id="15" name="Slide Number Placeholder 14">
+            <a:extLst>
+              <a:ext uri="{FF2B5EF4-FFF2-40B4-BE49-F238E27FC236}">
+                <a16:creationId xmlns:a16="http://schemas.microsoft.com/office/drawing/2014/main" id="{96ED610D-79AD-623F-CA29-D4E727E09385}"/>
+              </a:ext>
+            </a:extLst>
+          </p:cNvPr>
+          <p:cNvSpPr>
+            <a:spLocks noGrp="1"/>
+          </p:cNvSpPr>
+          <p:nvPr>
+            <p:ph type="sldNum" sz="quarter" idx="12"/>
+          </p:nvPr>
+        </p:nvSpPr>
+        <p:spPr/>
+        <p:txBody>
+          <a:bodyPr/>
+          <a:lstStyle/>
+          <a:p>
+            <a:fld id="{8D0AFDD5-844D-364D-8AEC-50CF4D36D55D}" type="slidenum">
+              <a:rPr lang="en-US" noProof="0" smtClean="0"/>
+              <a:pPr/>
+              <a:t>6</a:t>
+            </a:fld>
+            <a:endParaRPr lang="en-US" noProof="0"/>
+          </a:p>
+        </p:txBody>
+      </p:sp>
+      <p:sp>
+        <p:nvSpPr>
+          <p:cNvPr id="16" name="Footer Placeholder 15">
+            <a:extLst>
+              <a:ext uri="{FF2B5EF4-FFF2-40B4-BE49-F238E27FC236}">
+                <a16:creationId xmlns:a16="http://schemas.microsoft.com/office/drawing/2014/main" id="{6D5FEBB9-BE61-4635-53B3-D4A68E3B93AF}"/>
+              </a:ext>
+            </a:extLst>
+          </p:cNvPr>
+          <p:cNvSpPr>
+            <a:spLocks noGrp="1"/>
+          </p:cNvSpPr>
+          <p:nvPr>
+            <p:ph type="ftr" sz="quarter" idx="11"/>
+          </p:nvPr>
+        </p:nvSpPr>
+        <p:spPr/>
+        <p:txBody>
+          <a:bodyPr/>
+          <a:lstStyle/>
+          <a:p>
+            <a:r>
+              <a:rPr lang="en-US" noProof="0" dirty="0"/>
+              <a:t>PDFiles</a:t>
+            </a:r>
+          </a:p>
+        </p:txBody>
+      </p:sp>
+      <p:sp>
+        <p:nvSpPr>
+          <p:cNvPr id="17" name="Date Placeholder 16">
+            <a:extLst>
+              <a:ext uri="{FF2B5EF4-FFF2-40B4-BE49-F238E27FC236}">
+                <a16:creationId xmlns:a16="http://schemas.microsoft.com/office/drawing/2014/main" id="{3951DAD3-C9A2-FB28-4892-B6808A6CD9B1}"/>
+              </a:ext>
+            </a:extLst>
+          </p:cNvPr>
+          <p:cNvSpPr>
+            <a:spLocks noGrp="1"/>
+          </p:cNvSpPr>
+          <p:nvPr>
+            <p:ph type="dt" sz="half" idx="10"/>
+          </p:nvPr>
+        </p:nvSpPr>
+        <p:spPr/>
+        <p:txBody>
+          <a:bodyPr/>
+          <a:lstStyle/>
+          <a:p>
+            <a:r>
+              <a:rPr lang="en-US" noProof="0"/>
+              <a:t>2024-25</a:t>
+            </a:r>
+            <a:endParaRPr lang="en-US" noProof="0" dirty="0"/>
+          </a:p>
+        </p:txBody>
+      </p:sp>
+      <p:sp>
+        <p:nvSpPr>
+          <p:cNvPr id="24" name="Text Placeholder 4">
+            <a:extLst>
+              <a:ext uri="{FF2B5EF4-FFF2-40B4-BE49-F238E27FC236}">
+                <a16:creationId xmlns:a16="http://schemas.microsoft.com/office/drawing/2014/main" id="{50E15873-C8ED-3CBB-2300-8DB5C4190055}"/>
+              </a:ext>
+            </a:extLst>
+          </p:cNvPr>
+          <p:cNvSpPr txBox="1">
+            <a:spLocks/>
+          </p:cNvSpPr>
+          <p:nvPr/>
+        </p:nvSpPr>
+        <p:spPr>
+          <a:xfrm>
+            <a:off x="3581400" y="2383971"/>
+            <a:ext cx="2514600" cy="3095625"/>
+          </a:xfrm>
+          <a:prstGeom prst="rect">
+            <a:avLst/>
+          </a:prstGeom>
+        </p:spPr>
+        <p:txBody>
+          <a:bodyPr vert="horz" lIns="91440" tIns="45720" rIns="91440" bIns="45720" rtlCol="0">
+            <a:noAutofit/>
+          </a:bodyPr>
+          <a:lstStyle>
+            <a:lvl1pPr marL="0" indent="0" algn="ctr" defTabSz="914400" rtl="0" eaLnBrk="1" latinLnBrk="0" hangingPunct="1">
+              <a:lnSpc>
+                <a:spcPct val="100000"/>
+              </a:lnSpc>
+              <a:spcBef>
+                <a:spcPts val="0"/>
+              </a:spcBef>
+              <a:buFont typeface="Arial" panose="020B0604020202020204" pitchFamily="34" charset="0"/>
+              <a:buNone/>
+              <a:defRPr sz="1600" kern="1200">
+                <a:solidFill>
+                  <a:schemeClr val="tx1"/>
+                </a:solidFill>
+                <a:latin typeface="+mn-lt"/>
+                <a:ea typeface="+mn-ea"/>
+                <a:cs typeface="+mn-cs"/>
+              </a:defRPr>
+            </a:lvl1pPr>
+            <a:lvl2pPr marL="685800" indent="-228600" algn="l" defTabSz="914400" rtl="0" eaLnBrk="1" latinLnBrk="0" hangingPunct="1">
+              <a:lnSpc>
+                <a:spcPct val="90000"/>
+              </a:lnSpc>
+              <a:spcBef>
+                <a:spcPts val="500"/>
+              </a:spcBef>
+              <a:buFont typeface="Arial" panose="020B0604020202020204" pitchFamily="34" charset="0"/>
+              <a:buChar char="•"/>
+              <a:defRPr sz="2400" kern="1200">
+                <a:solidFill>
+                  <a:schemeClr val="tx1"/>
+                </a:solidFill>
+                <a:latin typeface="+mn-lt"/>
+                <a:ea typeface="+mn-ea"/>
+                <a:cs typeface="+mn-cs"/>
+              </a:defRPr>
+            </a:lvl2pPr>
+            <a:lvl3pPr marL="1143000" indent="-228600" algn="l" defTabSz="914400" rtl="0" eaLnBrk="1" latinLnBrk="0" hangingPunct="1">
+              <a:lnSpc>
+                <a:spcPct val="90000"/>
+              </a:lnSpc>
+              <a:spcBef>
+                <a:spcPts val="500"/>
+              </a:spcBef>
+              <a:buFont typeface="Arial" panose="020B0604020202020204" pitchFamily="34" charset="0"/>
+              <a:buChar char="•"/>
+              <a:defRPr sz="2000" kern="1200">
+                <a:solidFill>
+                  <a:schemeClr val="tx1"/>
+                </a:solidFill>
+                <a:latin typeface="+mn-lt"/>
+                <a:ea typeface="+mn-ea"/>
+                <a:cs typeface="+mn-cs"/>
+              </a:defRPr>
+            </a:lvl3pPr>
+            <a:lvl4pPr marL="1600200" indent="-228600" algn="l" defTabSz="914400" rtl="0" eaLnBrk="1" latinLnBrk="0" hangingPunct="1">
+              <a:lnSpc>
+                <a:spcPct val="90000"/>
+              </a:lnSpc>
+              <a:spcBef>
+                <a:spcPts val="500"/>
+              </a:spcBef>
+              <a:buFont typeface="Arial" panose="020B0604020202020204" pitchFamily="34" charset="0"/>
+              <a:buChar char="•"/>
+              <a:defRPr sz="1800" kern="1200">
+                <a:solidFill>
+                  <a:schemeClr val="tx1"/>
+                </a:solidFill>
+                <a:latin typeface="+mn-lt"/>
+                <a:ea typeface="+mn-ea"/>
+                <a:cs typeface="+mn-cs"/>
+              </a:defRPr>
+            </a:lvl4pPr>
+            <a:lvl5pPr marL="2057400" indent="-228600" algn="l" defTabSz="914400" rtl="0" eaLnBrk="1" latinLnBrk="0" hangingPunct="1">
+              <a:lnSpc>
+                <a:spcPct val="90000"/>
+              </a:lnSpc>
+              <a:spcBef>
+                <a:spcPts val="500"/>
+              </a:spcBef>
+              <a:buFont typeface="Arial" panose="020B0604020202020204" pitchFamily="34" charset="0"/>
+              <a:buChar char="•"/>
+              <a:defRPr sz="1800" kern="1200">
+                <a:solidFill>
+                  <a:schemeClr val="tx1"/>
+                </a:solidFill>
+                <a:latin typeface="+mn-lt"/>
+                <a:ea typeface="+mn-ea"/>
+                <a:cs typeface="+mn-cs"/>
+              </a:defRPr>
+            </a:lvl5pPr>
+            <a:lvl6pPr marL="2514600" indent="-228600" algn="l" defTabSz="914400" rtl="0" eaLnBrk="1" latinLnBrk="0" hangingPunct="1">
+              <a:lnSpc>
+                <a:spcPct val="90000"/>
+              </a:lnSpc>
+              <a:spcBef>
+                <a:spcPts val="500"/>
+              </a:spcBef>
+              <a:buFont typeface="Arial" panose="020B0604020202020204" pitchFamily="34" charset="0"/>
+              <a:buChar char="•"/>
+              <a:defRPr sz="1800" kern="1200">
+                <a:solidFill>
+                  <a:schemeClr val="tx1"/>
+                </a:solidFill>
+                <a:latin typeface="+mn-lt"/>
+                <a:ea typeface="+mn-ea"/>
+                <a:cs typeface="+mn-cs"/>
+              </a:defRPr>
+            </a:lvl6pPr>
+            <a:lvl7pPr marL="2971800" indent="-228600" algn="l" defTabSz="914400" rtl="0" eaLnBrk="1" latinLnBrk="0" hangingPunct="1">
+              <a:lnSpc>
+                <a:spcPct val="90000"/>
+              </a:lnSpc>
+              <a:spcBef>
+                <a:spcPts val="500"/>
+              </a:spcBef>
+              <a:buFont typeface="Arial" panose="020B0604020202020204" pitchFamily="34" charset="0"/>
+              <a:buChar char="•"/>
+              <a:defRPr sz="1800" kern="1200">
+                <a:solidFill>
+                  <a:schemeClr val="tx1"/>
+                </a:solidFill>
+                <a:latin typeface="+mn-lt"/>
+                <a:ea typeface="+mn-ea"/>
+                <a:cs typeface="+mn-cs"/>
+              </a:defRPr>
+            </a:lvl7pPr>
+            <a:lvl8pPr marL="3429000" indent="-228600" algn="l" defTabSz="914400" rtl="0" eaLnBrk="1" latinLnBrk="0" hangingPunct="1">
+              <a:lnSpc>
+                <a:spcPct val="90000"/>
+              </a:lnSpc>
+              <a:spcBef>
+                <a:spcPts val="500"/>
+              </a:spcBef>
+              <a:buFont typeface="Arial" panose="020B0604020202020204" pitchFamily="34" charset="0"/>
+              <a:buChar char="•"/>
+              <a:defRPr sz="1800" kern="1200">
+                <a:solidFill>
+                  <a:schemeClr val="tx1"/>
+                </a:solidFill>
+                <a:latin typeface="+mn-lt"/>
+                <a:ea typeface="+mn-ea"/>
+                <a:cs typeface="+mn-cs"/>
+              </a:defRPr>
+            </a:lvl8pPr>
+            <a:lvl9pPr marL="3886200" indent="-228600" algn="l" defTabSz="914400" rtl="0" eaLnBrk="1" latinLnBrk="0" hangingPunct="1">
+              <a:lnSpc>
+                <a:spcPct val="90000"/>
+              </a:lnSpc>
+              <a:spcBef>
+                <a:spcPts val="500"/>
+              </a:spcBef>
+              <a:buFont typeface="Arial" panose="020B0604020202020204" pitchFamily="34" charset="0"/>
+              <a:buChar char="•"/>
+              <a:defRPr sz="1800" kern="1200">
+                <a:solidFill>
+                  <a:schemeClr val="tx1"/>
+                </a:solidFill>
+                <a:latin typeface="+mn-lt"/>
+                <a:ea typeface="+mn-ea"/>
+                <a:cs typeface="+mn-cs"/>
+              </a:defRPr>
+            </a:lvl9pPr>
+          </a:lstStyle>
+          <a:p>
+            <a:r>
+              <a:rPr lang="en-US" sz="2000" b="1" u="sng" dirty="0"/>
+              <a:t>Cross Platform:</a:t>
+            </a:r>
+          </a:p>
+          <a:p>
+            <a:r>
+              <a:rPr lang="en-US" sz="2000" dirty="0"/>
+              <a:t>This tool is fully supported on all major platforms which run Python. It can be run natively on Windows, MacOS, and most Linux distributions.</a:t>
+            </a:r>
+          </a:p>
+        </p:txBody>
+      </p:sp>
+      <p:sp>
+        <p:nvSpPr>
+          <p:cNvPr id="25" name="Text Placeholder 4">
+            <a:extLst>
+              <a:ext uri="{FF2B5EF4-FFF2-40B4-BE49-F238E27FC236}">
+                <a16:creationId xmlns:a16="http://schemas.microsoft.com/office/drawing/2014/main" id="{1EF33D02-AE08-DEA7-113F-CDDE37D04387}"/>
+              </a:ext>
+            </a:extLst>
+          </p:cNvPr>
+          <p:cNvSpPr txBox="1">
+            <a:spLocks/>
+          </p:cNvSpPr>
+          <p:nvPr/>
+        </p:nvSpPr>
+        <p:spPr>
+          <a:xfrm>
+            <a:off x="6422571" y="2340893"/>
+            <a:ext cx="2514600" cy="3095625"/>
+          </a:xfrm>
+          <a:prstGeom prst="rect">
+            <a:avLst/>
+          </a:prstGeom>
+        </p:spPr>
+        <p:txBody>
+          <a:bodyPr vert="horz" lIns="91440" tIns="45720" rIns="91440" bIns="45720" rtlCol="0">
+            <a:noAutofit/>
+          </a:bodyPr>
+          <a:lstStyle>
+            <a:lvl1pPr marL="0" indent="0" algn="ctr" defTabSz="914400" rtl="0" eaLnBrk="1" latinLnBrk="0" hangingPunct="1">
+              <a:lnSpc>
+                <a:spcPct val="100000"/>
+              </a:lnSpc>
+              <a:spcBef>
+                <a:spcPts val="0"/>
+              </a:spcBef>
+              <a:buFont typeface="Arial" panose="020B0604020202020204" pitchFamily="34" charset="0"/>
+              <a:buNone/>
+              <a:defRPr sz="1600" kern="1200">
+                <a:solidFill>
+                  <a:schemeClr val="tx1"/>
+                </a:solidFill>
+                <a:latin typeface="+mn-lt"/>
+                <a:ea typeface="+mn-ea"/>
+                <a:cs typeface="+mn-cs"/>
+              </a:defRPr>
+            </a:lvl1pPr>
+            <a:lvl2pPr marL="685800" indent="-228600" algn="l" defTabSz="914400" rtl="0" eaLnBrk="1" latinLnBrk="0" hangingPunct="1">
+              <a:lnSpc>
+                <a:spcPct val="90000"/>
+              </a:lnSpc>
+              <a:spcBef>
+                <a:spcPts val="500"/>
+              </a:spcBef>
+              <a:buFont typeface="Arial" panose="020B0604020202020204" pitchFamily="34" charset="0"/>
+              <a:buChar char="•"/>
+              <a:defRPr sz="2400" kern="1200">
+                <a:solidFill>
+                  <a:schemeClr val="tx1"/>
+                </a:solidFill>
+                <a:latin typeface="+mn-lt"/>
+                <a:ea typeface="+mn-ea"/>
+                <a:cs typeface="+mn-cs"/>
+              </a:defRPr>
+            </a:lvl2pPr>
+            <a:lvl3pPr marL="1143000" indent="-228600" algn="l" defTabSz="914400" rtl="0" eaLnBrk="1" latinLnBrk="0" hangingPunct="1">
+              <a:lnSpc>
+                <a:spcPct val="90000"/>
+              </a:lnSpc>
+              <a:spcBef>
+                <a:spcPts val="500"/>
+              </a:spcBef>
+              <a:buFont typeface="Arial" panose="020B0604020202020204" pitchFamily="34" charset="0"/>
+              <a:buChar char="•"/>
+              <a:defRPr sz="2000" kern="1200">
+                <a:solidFill>
+                  <a:schemeClr val="tx1"/>
+                </a:solidFill>
+                <a:latin typeface="+mn-lt"/>
+                <a:ea typeface="+mn-ea"/>
+                <a:cs typeface="+mn-cs"/>
+              </a:defRPr>
+            </a:lvl3pPr>
+            <a:lvl4pPr marL="1600200" indent="-228600" algn="l" defTabSz="914400" rtl="0" eaLnBrk="1" latinLnBrk="0" hangingPunct="1">
+              <a:lnSpc>
+                <a:spcPct val="90000"/>
+              </a:lnSpc>
+              <a:spcBef>
+                <a:spcPts val="500"/>
+              </a:spcBef>
+              <a:buFont typeface="Arial" panose="020B0604020202020204" pitchFamily="34" charset="0"/>
+              <a:buChar char="•"/>
+              <a:defRPr sz="1800" kern="1200">
+                <a:solidFill>
+                  <a:schemeClr val="tx1"/>
+                </a:solidFill>
+                <a:latin typeface="+mn-lt"/>
+                <a:ea typeface="+mn-ea"/>
+                <a:cs typeface="+mn-cs"/>
+              </a:defRPr>
+            </a:lvl4pPr>
+            <a:lvl5pPr marL="2057400" indent="-228600" algn="l" defTabSz="914400" rtl="0" eaLnBrk="1" latinLnBrk="0" hangingPunct="1">
+              <a:lnSpc>
+                <a:spcPct val="90000"/>
+              </a:lnSpc>
+              <a:spcBef>
+                <a:spcPts val="500"/>
+              </a:spcBef>
+              <a:buFont typeface="Arial" panose="020B0604020202020204" pitchFamily="34" charset="0"/>
+              <a:buChar char="•"/>
+              <a:defRPr sz="1800" kern="1200">
+                <a:solidFill>
+                  <a:schemeClr val="tx1"/>
+                </a:solidFill>
+                <a:latin typeface="+mn-lt"/>
+                <a:ea typeface="+mn-ea"/>
+                <a:cs typeface="+mn-cs"/>
+              </a:defRPr>
+            </a:lvl5pPr>
+            <a:lvl6pPr marL="2514600" indent="-228600" algn="l" defTabSz="914400" rtl="0" eaLnBrk="1" latinLnBrk="0" hangingPunct="1">
+              <a:lnSpc>
+                <a:spcPct val="90000"/>
+              </a:lnSpc>
+              <a:spcBef>
+                <a:spcPts val="500"/>
+              </a:spcBef>
+              <a:buFont typeface="Arial" panose="020B0604020202020204" pitchFamily="34" charset="0"/>
+              <a:buChar char="•"/>
+              <a:defRPr sz="1800" kern="1200">
+                <a:solidFill>
+                  <a:schemeClr val="tx1"/>
+                </a:solidFill>
+                <a:latin typeface="+mn-lt"/>
+                <a:ea typeface="+mn-ea"/>
+                <a:cs typeface="+mn-cs"/>
+              </a:defRPr>
+            </a:lvl6pPr>
+            <a:lvl7pPr marL="2971800" indent="-228600" algn="l" defTabSz="914400" rtl="0" eaLnBrk="1" latinLnBrk="0" hangingPunct="1">
+              <a:lnSpc>
+                <a:spcPct val="90000"/>
+              </a:lnSpc>
+              <a:spcBef>
+                <a:spcPts val="500"/>
+              </a:spcBef>
+              <a:buFont typeface="Arial" panose="020B0604020202020204" pitchFamily="34" charset="0"/>
+              <a:buChar char="•"/>
+              <a:defRPr sz="1800" kern="1200">
+                <a:solidFill>
+                  <a:schemeClr val="tx1"/>
+                </a:solidFill>
+                <a:latin typeface="+mn-lt"/>
+                <a:ea typeface="+mn-ea"/>
+                <a:cs typeface="+mn-cs"/>
+              </a:defRPr>
+            </a:lvl7pPr>
+            <a:lvl8pPr marL="3429000" indent="-228600" algn="l" defTabSz="914400" rtl="0" eaLnBrk="1" latinLnBrk="0" hangingPunct="1">
+              <a:lnSpc>
+                <a:spcPct val="90000"/>
+              </a:lnSpc>
+              <a:spcBef>
+                <a:spcPts val="500"/>
+              </a:spcBef>
+              <a:buFont typeface="Arial" panose="020B0604020202020204" pitchFamily="34" charset="0"/>
+              <a:buChar char="•"/>
+              <a:defRPr sz="1800" kern="1200">
+                <a:solidFill>
+                  <a:schemeClr val="tx1"/>
+                </a:solidFill>
+                <a:latin typeface="+mn-lt"/>
+                <a:ea typeface="+mn-ea"/>
+                <a:cs typeface="+mn-cs"/>
+              </a:defRPr>
+            </a:lvl8pPr>
+            <a:lvl9pPr marL="3886200" indent="-228600" algn="l" defTabSz="914400" rtl="0" eaLnBrk="1" latinLnBrk="0" hangingPunct="1">
+              <a:lnSpc>
+                <a:spcPct val="90000"/>
+              </a:lnSpc>
+              <a:spcBef>
+                <a:spcPts val="500"/>
+              </a:spcBef>
+              <a:buFont typeface="Arial" panose="020B0604020202020204" pitchFamily="34" charset="0"/>
+              <a:buChar char="•"/>
+              <a:defRPr sz="1800" kern="1200">
+                <a:solidFill>
+                  <a:schemeClr val="tx1"/>
+                </a:solidFill>
+                <a:latin typeface="+mn-lt"/>
+                <a:ea typeface="+mn-ea"/>
+                <a:cs typeface="+mn-cs"/>
+              </a:defRPr>
+            </a:lvl9pPr>
+          </a:lstStyle>
+          <a:p>
+            <a:r>
+              <a:rPr lang="en-US" sz="2000" b="1" u="sng" dirty="0"/>
+              <a:t>Enhanced Security and Privacy:</a:t>
+            </a:r>
+            <a:r>
+              <a:rPr lang="en-US" sz="2000" dirty="0"/>
+              <a:t> Since the program runs locally, users can manage their PDFs without the risk of sensitive documents being intercepted over the cloud, which can be a threat with online PDF services. </a:t>
+            </a:r>
+            <a:endParaRPr lang="en-US" sz="1800" b="1" u="sng" dirty="0"/>
+          </a:p>
+        </p:txBody>
+      </p:sp>
+      <p:sp>
+        <p:nvSpPr>
+          <p:cNvPr id="26" name="Text Placeholder 4">
+            <a:extLst>
+              <a:ext uri="{FF2B5EF4-FFF2-40B4-BE49-F238E27FC236}">
+                <a16:creationId xmlns:a16="http://schemas.microsoft.com/office/drawing/2014/main" id="{1AEF0C0D-B275-5917-8F6D-D4542519D333}"/>
+              </a:ext>
+            </a:extLst>
+          </p:cNvPr>
+          <p:cNvSpPr txBox="1">
+            <a:spLocks/>
+          </p:cNvSpPr>
+          <p:nvPr/>
+        </p:nvSpPr>
+        <p:spPr>
+          <a:xfrm>
+            <a:off x="9263742" y="2340893"/>
+            <a:ext cx="2514600" cy="3095625"/>
+          </a:xfrm>
+          <a:prstGeom prst="rect">
+            <a:avLst/>
+          </a:prstGeom>
+        </p:spPr>
+        <p:txBody>
+          <a:bodyPr vert="horz" lIns="91440" tIns="45720" rIns="91440" bIns="45720" rtlCol="0">
+            <a:noAutofit/>
+          </a:bodyPr>
+          <a:lstStyle>
+            <a:lvl1pPr marL="0" indent="0" algn="ctr" defTabSz="914400" rtl="0" eaLnBrk="1" latinLnBrk="0" hangingPunct="1">
+              <a:lnSpc>
+                <a:spcPct val="100000"/>
+              </a:lnSpc>
+              <a:spcBef>
+                <a:spcPts val="0"/>
+              </a:spcBef>
+              <a:buFont typeface="Arial" panose="020B0604020202020204" pitchFamily="34" charset="0"/>
+              <a:buNone/>
+              <a:defRPr sz="1600" kern="1200">
+                <a:solidFill>
+                  <a:schemeClr val="tx1"/>
+                </a:solidFill>
+                <a:latin typeface="+mn-lt"/>
+                <a:ea typeface="+mn-ea"/>
+                <a:cs typeface="+mn-cs"/>
+              </a:defRPr>
+            </a:lvl1pPr>
+            <a:lvl2pPr marL="685800" indent="-228600" algn="l" defTabSz="914400" rtl="0" eaLnBrk="1" latinLnBrk="0" hangingPunct="1">
+              <a:lnSpc>
+                <a:spcPct val="90000"/>
+              </a:lnSpc>
+              <a:spcBef>
+                <a:spcPts val="500"/>
+              </a:spcBef>
+              <a:buFont typeface="Arial" panose="020B0604020202020204" pitchFamily="34" charset="0"/>
+              <a:buChar char="•"/>
+              <a:defRPr sz="2400" kern="1200">
+                <a:solidFill>
+                  <a:schemeClr val="tx1"/>
+                </a:solidFill>
+                <a:latin typeface="+mn-lt"/>
+                <a:ea typeface="+mn-ea"/>
+                <a:cs typeface="+mn-cs"/>
+              </a:defRPr>
+            </a:lvl2pPr>
+            <a:lvl3pPr marL="1143000" indent="-228600" algn="l" defTabSz="914400" rtl="0" eaLnBrk="1" latinLnBrk="0" hangingPunct="1">
+              <a:lnSpc>
+                <a:spcPct val="90000"/>
+              </a:lnSpc>
+              <a:spcBef>
+                <a:spcPts val="500"/>
+              </a:spcBef>
+              <a:buFont typeface="Arial" panose="020B0604020202020204" pitchFamily="34" charset="0"/>
+              <a:buChar char="•"/>
+              <a:defRPr sz="2000" kern="1200">
+                <a:solidFill>
+                  <a:schemeClr val="tx1"/>
+                </a:solidFill>
+                <a:latin typeface="+mn-lt"/>
+                <a:ea typeface="+mn-ea"/>
+                <a:cs typeface="+mn-cs"/>
+              </a:defRPr>
+            </a:lvl3pPr>
+            <a:lvl4pPr marL="1600200" indent="-228600" algn="l" defTabSz="914400" rtl="0" eaLnBrk="1" latinLnBrk="0" hangingPunct="1">
+              <a:lnSpc>
+                <a:spcPct val="90000"/>
+              </a:lnSpc>
+              <a:spcBef>
+                <a:spcPts val="500"/>
+              </a:spcBef>
+              <a:buFont typeface="Arial" panose="020B0604020202020204" pitchFamily="34" charset="0"/>
+              <a:buChar char="•"/>
+              <a:defRPr sz="1800" kern="1200">
+                <a:solidFill>
+                  <a:schemeClr val="tx1"/>
+                </a:solidFill>
+                <a:latin typeface="+mn-lt"/>
+                <a:ea typeface="+mn-ea"/>
+                <a:cs typeface="+mn-cs"/>
+              </a:defRPr>
+            </a:lvl4pPr>
+            <a:lvl5pPr marL="2057400" indent="-228600" algn="l" defTabSz="914400" rtl="0" eaLnBrk="1" latinLnBrk="0" hangingPunct="1">
+              <a:lnSpc>
+                <a:spcPct val="90000"/>
+              </a:lnSpc>
+              <a:spcBef>
+                <a:spcPts val="500"/>
+              </a:spcBef>
+              <a:buFont typeface="Arial" panose="020B0604020202020204" pitchFamily="34" charset="0"/>
+              <a:buChar char="•"/>
+              <a:defRPr sz="1800" kern="1200">
+                <a:solidFill>
+                  <a:schemeClr val="tx1"/>
+                </a:solidFill>
+                <a:latin typeface="+mn-lt"/>
+                <a:ea typeface="+mn-ea"/>
+                <a:cs typeface="+mn-cs"/>
+              </a:defRPr>
+            </a:lvl5pPr>
+            <a:lvl6pPr marL="2514600" indent="-228600" algn="l" defTabSz="914400" rtl="0" eaLnBrk="1" latinLnBrk="0" hangingPunct="1">
+              <a:lnSpc>
+                <a:spcPct val="90000"/>
+              </a:lnSpc>
+              <a:spcBef>
+                <a:spcPts val="500"/>
+              </a:spcBef>
+              <a:buFont typeface="Arial" panose="020B0604020202020204" pitchFamily="34" charset="0"/>
+              <a:buChar char="•"/>
+              <a:defRPr sz="1800" kern="1200">
+                <a:solidFill>
+                  <a:schemeClr val="tx1"/>
+                </a:solidFill>
+                <a:latin typeface="+mn-lt"/>
+                <a:ea typeface="+mn-ea"/>
+                <a:cs typeface="+mn-cs"/>
+              </a:defRPr>
+            </a:lvl6pPr>
+            <a:lvl7pPr marL="2971800" indent="-228600" algn="l" defTabSz="914400" rtl="0" eaLnBrk="1" latinLnBrk="0" hangingPunct="1">
+              <a:lnSpc>
+                <a:spcPct val="90000"/>
+              </a:lnSpc>
+              <a:spcBef>
+                <a:spcPts val="500"/>
+              </a:spcBef>
+              <a:buFont typeface="Arial" panose="020B0604020202020204" pitchFamily="34" charset="0"/>
+              <a:buChar char="•"/>
+              <a:defRPr sz="1800" kern="1200">
+                <a:solidFill>
+                  <a:schemeClr val="tx1"/>
+                </a:solidFill>
+                <a:latin typeface="+mn-lt"/>
+                <a:ea typeface="+mn-ea"/>
+                <a:cs typeface="+mn-cs"/>
+              </a:defRPr>
+            </a:lvl7pPr>
+            <a:lvl8pPr marL="3429000" indent="-228600" algn="l" defTabSz="914400" rtl="0" eaLnBrk="1" latinLnBrk="0" hangingPunct="1">
+              <a:lnSpc>
+                <a:spcPct val="90000"/>
+              </a:lnSpc>
+              <a:spcBef>
+                <a:spcPts val="500"/>
+              </a:spcBef>
+              <a:buFont typeface="Arial" panose="020B0604020202020204" pitchFamily="34" charset="0"/>
+              <a:buChar char="•"/>
+              <a:defRPr sz="1800" kern="1200">
+                <a:solidFill>
+                  <a:schemeClr val="tx1"/>
+                </a:solidFill>
+                <a:latin typeface="+mn-lt"/>
+                <a:ea typeface="+mn-ea"/>
+                <a:cs typeface="+mn-cs"/>
+              </a:defRPr>
+            </a:lvl8pPr>
+            <a:lvl9pPr marL="3886200" indent="-228600" algn="l" defTabSz="914400" rtl="0" eaLnBrk="1" latinLnBrk="0" hangingPunct="1">
+              <a:lnSpc>
+                <a:spcPct val="90000"/>
+              </a:lnSpc>
+              <a:spcBef>
+                <a:spcPts val="500"/>
+              </a:spcBef>
+              <a:buFont typeface="Arial" panose="020B0604020202020204" pitchFamily="34" charset="0"/>
+              <a:buChar char="•"/>
+              <a:defRPr sz="1800" kern="1200">
+                <a:solidFill>
+                  <a:schemeClr val="tx1"/>
+                </a:solidFill>
+                <a:latin typeface="+mn-lt"/>
+                <a:ea typeface="+mn-ea"/>
+                <a:cs typeface="+mn-cs"/>
+              </a:defRPr>
+            </a:lvl9pPr>
+          </a:lstStyle>
+          <a:p>
+            <a:r>
+              <a:rPr lang="en-US" sz="2000" b="1" u="sng" dirty="0"/>
+              <a:t>Reliable and Trustworthy: </a:t>
+            </a:r>
+            <a:r>
+              <a:rPr lang="en-US" sz="2000" dirty="0"/>
+              <a:t>Unlike many online services that may store and sell uploaded documents without approval, this tool does not retain any PDFs, making it a secure choice for handling confidential files.</a:t>
+            </a:r>
+            <a:endParaRPr lang="en-US" sz="1800" dirty="0"/>
           </a:p>
         </p:txBody>
       </p:sp>
     </p:spTree>
     <p:extLst>
       <p:ext uri="{BB962C8B-B14F-4D97-AF65-F5344CB8AC3E}">
-        <p14:creationId xmlns:p14="http://schemas.microsoft.com/office/powerpoint/2010/main" val="2412395826"/>
+        <p14:creationId xmlns:p14="http://schemas.microsoft.com/office/powerpoint/2010/main" val="3423757570"/>
       </p:ext>
     </p:extLst>
   </p:cSld>
   <p:clrMapOvr>
     <a:masterClrMapping/>
   </p:clrMapOvr>
+  <mc:AlternateContent xmlns:mc="http://schemas.openxmlformats.org/markup-compatibility/2006" xmlns:p15="http://schemas.microsoft.com/office/powerpoint/2012/main">
+    <mc:Choice Requires="p15">
+      <p:transition xmlns:p14="http://schemas.microsoft.com/office/powerpoint/2010/main" spd="slow" p14:dur="3250">
+        <p15:prstTrans prst="origami"/>
+      </p:transition>
+    </mc:Choice>
+    <mc:Fallback xmlns="">
+      <p:transition spd="slow">
+        <p:fade/>
+      </p:transition>
+    </mc:Fallback>
+  </mc:AlternateContent>
 </p:sld>
 </file>
 
@@ -14081,7 +15088,7 @@
           <p:cNvPr id="2" name="Title 1">
             <a:extLst>
               <a:ext uri="{FF2B5EF4-FFF2-40B4-BE49-F238E27FC236}">
-                <a16:creationId xmlns:a16="http://schemas.microsoft.com/office/drawing/2014/main" id="{88016E8D-F725-5549-D79B-2197F3311E34}"/>
+                <a16:creationId xmlns:a16="http://schemas.microsoft.com/office/drawing/2014/main" id="{C3245750-778C-26A4-693A-9F7698202DCC}"/>
               </a:ext>
             </a:extLst>
           </p:cNvPr>
@@ -14092,235 +15099,77 @@
             <p:ph type="title"/>
           </p:nvPr>
         </p:nvSpPr>
-        <p:spPr/>
+        <p:spPr>
+          <a:xfrm>
+            <a:off x="515558" y="2341666"/>
+            <a:ext cx="4324679" cy="3767328"/>
+          </a:xfrm>
+        </p:spPr>
         <p:txBody>
           <a:bodyPr/>
           <a:lstStyle/>
           <a:p>
             <a:r>
-              <a:rPr lang="en-US" dirty="0"/>
-              <a:t>Other than all the flaws; </a:t>
-            </a:r>
-            <a:r>
-              <a:rPr lang="en-US" i="1" dirty="0"/>
-              <a:t>its flawless…</a:t>
-            </a:r>
-          </a:p>
-        </p:txBody>
-      </p:sp>
-      <p:sp>
-        <p:nvSpPr>
-          <p:cNvPr id="5" name="Text Placeholder 4">
-            <a:extLst>
-              <a:ext uri="{FF2B5EF4-FFF2-40B4-BE49-F238E27FC236}">
-                <a16:creationId xmlns:a16="http://schemas.microsoft.com/office/drawing/2014/main" id="{7B9D02FC-1940-72AB-8671-0839E2CF024F}"/>
-              </a:ext>
-            </a:extLst>
-          </p:cNvPr>
-          <p:cNvSpPr>
-            <a:spLocks noGrp="1"/>
-          </p:cNvSpPr>
-          <p:nvPr>
-            <p:ph type="body" sz="quarter" idx="15"/>
-          </p:nvPr>
-        </p:nvSpPr>
+              <a:rPr lang="en-US" sz="4800" dirty="0"/>
+              <a:t>Code Review and</a:t>
+            </a:r>
+            <a:br>
+              <a:rPr lang="en-US" sz="4800" dirty="0"/>
+            </a:br>
+            <a:r>
+              <a:rPr lang="en-US" sz="4800" dirty="0"/>
+              <a:t>Live Demo</a:t>
+            </a:r>
+          </a:p>
+        </p:txBody>
+      </p:sp>
+      <p:pic>
+        <p:nvPicPr>
+          <p:cNvPr id="7" name="Picture Placeholder 6" descr="A green hill with blue sky and clouds&#10;&#10;Description automatically generated">
+            <a:extLst>
+              <a:ext uri="{FF2B5EF4-FFF2-40B4-BE49-F238E27FC236}">
+                <a16:creationId xmlns:a16="http://schemas.microsoft.com/office/drawing/2014/main" id="{5C5BB6A1-BECB-37B8-2E23-CDEF6AD9B430}"/>
+              </a:ext>
+            </a:extLst>
+          </p:cNvPr>
+          <p:cNvPicPr>
+            <a:picLocks noGrp="1" noChangeAspect="1"/>
+          </p:cNvPicPr>
+          <p:nvPr>
+            <p:ph type="pic" sz="quarter" idx="10"/>
+          </p:nvPr>
+        </p:nvPicPr>
+        <p:blipFill>
+          <a:blip r:embed="rId2"/>
+          <a:srcRect l="16667" r="16667"/>
+          <a:stretch>
+            <a:fillRect/>
+          </a:stretch>
+        </p:blipFill>
         <p:spPr/>
-        <p:txBody>
-          <a:bodyPr/>
-          <a:lstStyle/>
-          <a:p>
-            <a:r>
-              <a:rPr lang="en-US" dirty="0"/>
-              <a:t>“</a:t>
-            </a:r>
-          </a:p>
-        </p:txBody>
-      </p:sp>
-      <p:sp>
-        <p:nvSpPr>
-          <p:cNvPr id="6" name="Content Placeholder 5">
-            <a:extLst>
-              <a:ext uri="{FF2B5EF4-FFF2-40B4-BE49-F238E27FC236}">
-                <a16:creationId xmlns:a16="http://schemas.microsoft.com/office/drawing/2014/main" id="{6AB13DEF-ED86-6E5A-5AD2-C9B364E4A295}"/>
-              </a:ext>
-            </a:extLst>
-          </p:cNvPr>
-          <p:cNvSpPr>
-            <a:spLocks noGrp="1"/>
-          </p:cNvSpPr>
-          <p:nvPr>
-            <p:ph idx="1"/>
-          </p:nvPr>
-        </p:nvSpPr>
-        <p:spPr>
-          <a:xfrm>
-            <a:off x="2862071" y="4334256"/>
-            <a:ext cx="4409585" cy="585216"/>
-          </a:xfrm>
-        </p:spPr>
-        <p:txBody>
-          <a:bodyPr/>
-          <a:lstStyle/>
-          <a:p>
-            <a:r>
-              <a:rPr lang="en-US" altLang="zh-CN" sz="1800" dirty="0"/>
-              <a:t>Quote by Shriram </a:t>
-            </a:r>
-            <a:r>
-              <a:rPr lang="en-US" altLang="zh-CN" sz="1800" dirty="0" err="1"/>
-              <a:t>Viravan</a:t>
-            </a:r>
-            <a:r>
-              <a:rPr lang="en-US" altLang="zh-CN" sz="1800" dirty="0"/>
-              <a:t>, edited by Abyaz</a:t>
-            </a:r>
-            <a:endParaRPr lang="en-US" altLang="zh-CN" dirty="0"/>
-          </a:p>
-          <a:p>
-            <a:endParaRPr lang="en-US" dirty="0"/>
-          </a:p>
-        </p:txBody>
-      </p:sp>
-      <p:sp>
-        <p:nvSpPr>
-          <p:cNvPr id="4" name="Text Placeholder 3">
-            <a:extLst>
-              <a:ext uri="{FF2B5EF4-FFF2-40B4-BE49-F238E27FC236}">
-                <a16:creationId xmlns:a16="http://schemas.microsoft.com/office/drawing/2014/main" id="{F286FC47-3017-DA16-F8BF-CBFF553CB9F5}"/>
-              </a:ext>
-            </a:extLst>
-          </p:cNvPr>
-          <p:cNvSpPr>
-            <a:spLocks noGrp="1"/>
-          </p:cNvSpPr>
-          <p:nvPr>
-            <p:ph type="body" sz="quarter" idx="14"/>
-          </p:nvPr>
-        </p:nvSpPr>
-        <p:spPr/>
-        <p:txBody>
-          <a:bodyPr/>
-          <a:lstStyle/>
-          <a:p>
-            <a:r>
-              <a:rPr lang="en-US" dirty="0"/>
-              <a:t>”</a:t>
-            </a:r>
-          </a:p>
-        </p:txBody>
-      </p:sp>
-      <p:sp>
-        <p:nvSpPr>
-          <p:cNvPr id="8" name="Slide Number Placeholder 7">
-            <a:extLst>
-              <a:ext uri="{FF2B5EF4-FFF2-40B4-BE49-F238E27FC236}">
-                <a16:creationId xmlns:a16="http://schemas.microsoft.com/office/drawing/2014/main" id="{A07AC1F3-FBD2-24FF-608E-1D301D279213}"/>
-              </a:ext>
-            </a:extLst>
-          </p:cNvPr>
-          <p:cNvSpPr>
-            <a:spLocks noGrp="1"/>
-          </p:cNvSpPr>
-          <p:nvPr>
-            <p:ph type="sldNum" sz="quarter" idx="18"/>
-          </p:nvPr>
-        </p:nvSpPr>
-        <p:spPr>
-          <a:xfrm>
-            <a:off x="838200" y="6400904"/>
-            <a:ext cx="365760" cy="246888"/>
-          </a:xfrm>
-        </p:spPr>
-        <p:txBody>
-          <a:bodyPr/>
-          <a:lstStyle/>
-          <a:p>
-            <a:fld id="{8D0AFDD5-844D-364D-8AEC-50CF4D36D55D}" type="slidenum">
-              <a:rPr lang="en-US" smtClean="0"/>
-              <a:pPr/>
-              <a:t>7</a:t>
-            </a:fld>
-            <a:endParaRPr lang="en-US" dirty="0"/>
-          </a:p>
-        </p:txBody>
-      </p:sp>
-      <p:sp>
-        <p:nvSpPr>
-          <p:cNvPr id="7" name="Footer Placeholder 6">
-            <a:extLst>
-              <a:ext uri="{FF2B5EF4-FFF2-40B4-BE49-F238E27FC236}">
-                <a16:creationId xmlns:a16="http://schemas.microsoft.com/office/drawing/2014/main" id="{64C00235-80DB-8E65-4FFA-23DF4C0DE0E6}"/>
-              </a:ext>
-            </a:extLst>
-          </p:cNvPr>
-          <p:cNvSpPr>
-            <a:spLocks noGrp="1"/>
-          </p:cNvSpPr>
-          <p:nvPr>
-            <p:ph type="ftr" sz="quarter" idx="17"/>
-          </p:nvPr>
-        </p:nvSpPr>
-        <p:spPr>
-          <a:xfrm>
-            <a:off x="5364480" y="6400904"/>
-            <a:ext cx="1463040" cy="246888"/>
-          </a:xfrm>
-        </p:spPr>
-        <p:txBody>
-          <a:bodyPr/>
-          <a:lstStyle/>
-          <a:p>
-            <a:r>
-              <a:rPr lang="en-US" dirty="0" err="1"/>
-              <a:t>PDFiles</a:t>
-            </a:r>
-            <a:endParaRPr lang="en-US" dirty="0"/>
-          </a:p>
-        </p:txBody>
-      </p:sp>
-      <p:sp>
-        <p:nvSpPr>
-          <p:cNvPr id="3" name="Date Placeholder 2">
-            <a:extLst>
-              <a:ext uri="{FF2B5EF4-FFF2-40B4-BE49-F238E27FC236}">
-                <a16:creationId xmlns:a16="http://schemas.microsoft.com/office/drawing/2014/main" id="{F0A0E4D9-A114-4773-6B3B-37FA10EAB08F}"/>
-              </a:ext>
-            </a:extLst>
-          </p:cNvPr>
-          <p:cNvSpPr>
-            <a:spLocks noGrp="1"/>
-          </p:cNvSpPr>
-          <p:nvPr>
-            <p:ph type="dt" sz="half" idx="16"/>
-          </p:nvPr>
-        </p:nvSpPr>
-        <p:spPr>
-          <a:xfrm>
-            <a:off x="10629145" y="6400904"/>
-            <a:ext cx="640080" cy="246888"/>
-          </a:xfrm>
-        </p:spPr>
-        <p:txBody>
-          <a:bodyPr/>
-          <a:lstStyle/>
-          <a:p>
-            <a:r>
-              <a:rPr lang="en-US" dirty="0"/>
-              <a:t>2024-25</a:t>
-            </a:r>
-          </a:p>
-        </p:txBody>
-      </p:sp>
+      </p:pic>
     </p:spTree>
     <p:extLst>
       <p:ext uri="{BB962C8B-B14F-4D97-AF65-F5344CB8AC3E}">
-        <p14:creationId xmlns:p14="http://schemas.microsoft.com/office/powerpoint/2010/main" val="613288997"/>
+        <p14:creationId xmlns:p14="http://schemas.microsoft.com/office/powerpoint/2010/main" val="2412395826"/>
       </p:ext>
     </p:extLst>
   </p:cSld>
   <p:clrMapOvr>
     <a:masterClrMapping/>
   </p:clrMapOvr>
+  <mc:AlternateContent xmlns:mc="http://schemas.openxmlformats.org/markup-compatibility/2006" xmlns:p15="http://schemas.microsoft.com/office/powerpoint/2012/main">
+    <mc:Choice Requires="p15">
+      <p:transition xmlns:p14="http://schemas.microsoft.com/office/powerpoint/2010/main" spd="slow" p14:dur="3250">
+        <p15:prstTrans prst="origami"/>
+      </p:transition>
+    </mc:Choice>
+    <mc:Fallback xmlns="">
+      <p:transition spd="slow">
+        <p:fade/>
+      </p:transition>
+    </mc:Fallback>
+  </mc:AlternateContent>
 </p:sld>
 </file>
 
@@ -14341,47 +15190,65 @@
           <a:chExt cx="0" cy="0"/>
         </a:xfrm>
       </p:grpSpPr>
-      <p:sp>
-        <p:nvSpPr>
-          <p:cNvPr id="24" name="Title 23">
-            <a:extLst>
-              <a:ext uri="{FF2B5EF4-FFF2-40B4-BE49-F238E27FC236}">
-                <a16:creationId xmlns:a16="http://schemas.microsoft.com/office/drawing/2014/main" id="{A4C5B759-93CB-5B5A-B1D2-2E3C42747C75}"/>
-              </a:ext>
-            </a:extLst>
-          </p:cNvPr>
-          <p:cNvSpPr>
-            <a:spLocks noGrp="1"/>
-          </p:cNvSpPr>
-          <p:nvPr>
-            <p:ph type="ctrTitle"/>
-          </p:nvPr>
-        </p:nvSpPr>
-        <p:spPr>
-          <a:xfrm>
-            <a:off x="3638878" y="2631296"/>
-            <a:ext cx="4873752" cy="1709928"/>
-          </a:xfrm>
-        </p:spPr>
-        <p:txBody>
-          <a:bodyPr/>
-          <a:lstStyle/>
-          <a:p>
-            <a:pPr algn="ctr"/>
-            <a:r>
-              <a:rPr lang="en-US" dirty="0"/>
-              <a:t>Thank you</a:t>
-            </a:r>
-            <a:br>
-              <a:rPr lang="en-US" dirty="0"/>
-            </a:br>
-            <a:r>
-              <a:rPr lang="en-US" dirty="0"/>
-              <a:t>:D</a:t>
-            </a:r>
-          </a:p>
-        </p:txBody>
-      </p:sp>
+      <p:pic>
+        <p:nvPicPr>
+          <p:cNvPr id="3" name="Picture 2">
+            <a:extLst>
+              <a:ext uri="{FF2B5EF4-FFF2-40B4-BE49-F238E27FC236}">
+                <a16:creationId xmlns:a16="http://schemas.microsoft.com/office/drawing/2014/main" id="{EA10EC87-8101-351C-FDCF-4C9CCCEDE9BC}"/>
+              </a:ext>
+            </a:extLst>
+          </p:cNvPr>
+          <p:cNvPicPr>
+            <a:picLocks noChangeAspect="1"/>
+          </p:cNvPicPr>
+          <p:nvPr/>
+        </p:nvPicPr>
+        <p:blipFill>
+          <a:blip r:embed="rId2"/>
+          <a:srcRect l="32824" t="17866" r="31881" b="18975"/>
+          <a:stretch/>
+        </p:blipFill>
+        <p:spPr>
+          <a:xfrm>
+            <a:off x="4282272" y="1537398"/>
+            <a:ext cx="3627455" cy="3717890"/>
+          </a:xfrm>
+          <a:prstGeom prst="rect">
+            <a:avLst/>
+          </a:prstGeom>
+        </p:spPr>
+      </p:pic>
+      <p:pic>
+        <p:nvPicPr>
+          <p:cNvPr id="7" name="Picture 6">
+            <a:extLst>
+              <a:ext uri="{FF2B5EF4-FFF2-40B4-BE49-F238E27FC236}">
+                <a16:creationId xmlns:a16="http://schemas.microsoft.com/office/drawing/2014/main" id="{97891A37-79D1-6B9B-2A65-5C58816F42E2}"/>
+              </a:ext>
+            </a:extLst>
+          </p:cNvPr>
+          <p:cNvPicPr>
+            <a:picLocks noChangeAspect="1"/>
+          </p:cNvPicPr>
+          <p:nvPr/>
+        </p:nvPicPr>
+        <p:blipFill>
+          <a:blip r:embed="rId3"/>
+          <a:stretch>
+            <a:fillRect/>
+          </a:stretch>
+        </p:blipFill>
+        <p:spPr>
+          <a:xfrm>
+            <a:off x="-1" y="0"/>
+            <a:ext cx="12192000" cy="6858000"/>
+          </a:xfrm>
+          <a:prstGeom prst="rect">
+            <a:avLst/>
+          </a:prstGeom>
+        </p:spPr>
+      </p:pic>
     </p:spTree>
     <p:extLst>
       <p:ext uri="{BB962C8B-B14F-4D97-AF65-F5344CB8AC3E}">
@@ -14392,6 +15259,18 @@
   <p:clrMapOvr>
     <a:masterClrMapping/>
   </p:clrMapOvr>
+  <mc:AlternateContent xmlns:mc="http://schemas.openxmlformats.org/markup-compatibility/2006" xmlns:p15="http://schemas.microsoft.com/office/powerpoint/2012/main">
+    <mc:Choice Requires="p15">
+      <p:transition xmlns:p14="http://schemas.microsoft.com/office/powerpoint/2010/main" spd="slow" p14:dur="3250">
+        <p15:prstTrans prst="origami"/>
+      </p:transition>
+    </mc:Choice>
+    <mc:Fallback xmlns="">
+      <p:transition spd="slow">
+        <p:fade/>
+      </p:transition>
+    </mc:Fallback>
+  </mc:AlternateContent>
 </p:sld>
 </file>
 
@@ -14892,12 +15771,23 @@
 </file>
 
 <file path=customXml/item1.xml><?xml version="1.0" encoding="utf-8"?>
-<?mso-contentType ?>
-<FormTemplates xmlns="http://schemas.microsoft.com/sharepoint/v3/contenttype/forms">
-  <Display>DocumentLibraryForm</Display>
-  <Edit>DocumentLibraryForm</Edit>
-  <New>DocumentLibraryForm</New>
-</FormTemplates>
+<p:properties xmlns:p="http://schemas.microsoft.com/office/2006/metadata/properties" xmlns:xsi="http://www.w3.org/2001/XMLSchema-instance" xmlns:pc="http://schemas.microsoft.com/office/infopath/2007/PartnerControls">
+  <documentManagement>
+    <_ip_UnifiedCompliancePolicyUIAction xmlns="http://schemas.microsoft.com/sharepoint/v3" xsi:nil="true"/>
+    <Image xmlns="71af3243-3dd4-4a8d-8c0d-dd76da1f02a5">
+      <Url xsi:nil="true"/>
+      <Description xsi:nil="true"/>
+    </Image>
+    <Status xmlns="71af3243-3dd4-4a8d-8c0d-dd76da1f02a5">Not started</Status>
+    <Background xmlns="71af3243-3dd4-4a8d-8c0d-dd76da1f02a5">false</Background>
+    <_ip_UnifiedCompliancePolicyProperties xmlns="http://schemas.microsoft.com/sharepoint/v3" xsi:nil="true"/>
+    <ImageTagsTaxHTField xmlns="71af3243-3dd4-4a8d-8c0d-dd76da1f02a5">
+      <Terms xmlns="http://schemas.microsoft.com/office/infopath/2007/PartnerControls"/>
+    </ImageTagsTaxHTField>
+    <TaxCatchAll xmlns="230e9df3-be65-4c73-a93b-d1236ebd677e" xsi:nil="true"/>
+    <MediaServiceKeyPoints xmlns="71af3243-3dd4-4a8d-8c0d-dd76da1f02a5" xsi:nil="true"/>
+  </documentManagement>
+</p:properties>
 </file>
 
 <file path=customXml/item2.xml><?xml version="1.0" encoding="utf-8"?>
@@ -15189,29 +16079,22 @@
 </file>
 
 <file path=customXml/item3.xml><?xml version="1.0" encoding="utf-8"?>
-<p:properties xmlns:p="http://schemas.microsoft.com/office/2006/metadata/properties" xmlns:xsi="http://www.w3.org/2001/XMLSchema-instance" xmlns:pc="http://schemas.microsoft.com/office/infopath/2007/PartnerControls">
-  <documentManagement>
-    <_ip_UnifiedCompliancePolicyUIAction xmlns="http://schemas.microsoft.com/sharepoint/v3" xsi:nil="true"/>
-    <Image xmlns="71af3243-3dd4-4a8d-8c0d-dd76da1f02a5">
-      <Url xsi:nil="true"/>
-      <Description xsi:nil="true"/>
-    </Image>
-    <Status xmlns="71af3243-3dd4-4a8d-8c0d-dd76da1f02a5">Not started</Status>
-    <Background xmlns="71af3243-3dd4-4a8d-8c0d-dd76da1f02a5">false</Background>
-    <_ip_UnifiedCompliancePolicyProperties xmlns="http://schemas.microsoft.com/sharepoint/v3" xsi:nil="true"/>
-    <ImageTagsTaxHTField xmlns="71af3243-3dd4-4a8d-8c0d-dd76da1f02a5">
-      <Terms xmlns="http://schemas.microsoft.com/office/infopath/2007/PartnerControls"/>
-    </ImageTagsTaxHTField>
-    <TaxCatchAll xmlns="230e9df3-be65-4c73-a93b-d1236ebd677e" xsi:nil="true"/>
-    <MediaServiceKeyPoints xmlns="71af3243-3dd4-4a8d-8c0d-dd76da1f02a5" xsi:nil="true"/>
-  </documentManagement>
-</p:properties>
+<?mso-contentType ?>
+<FormTemplates xmlns="http://schemas.microsoft.com/sharepoint/v3/contenttype/forms">
+  <Display>DocumentLibraryForm</Display>
+  <Edit>DocumentLibraryForm</Edit>
+  <New>DocumentLibraryForm</New>
+</FormTemplates>
 </file>
 
 <file path=customXml/itemProps1.xml><?xml version="1.0" encoding="utf-8"?>
-<ds:datastoreItem xmlns:ds="http://schemas.openxmlformats.org/officeDocument/2006/customXml" ds:itemID="{5FA78568-A730-4D3B-A489-FD854E91254A}">
+<ds:datastoreItem xmlns:ds="http://schemas.openxmlformats.org/officeDocument/2006/customXml" ds:itemID="{61D9A46C-D3F3-4D45-B248-B831C6B5FC85}">
   <ds:schemaRefs>
-    <ds:schemaRef ds:uri="http://schemas.microsoft.com/sharepoint/v3/contenttype/forms"/>
+    <ds:schemaRef ds:uri="http://schemas.microsoft.com/office/2006/metadata/properties"/>
+    <ds:schemaRef ds:uri="http://schemas.microsoft.com/office/infopath/2007/PartnerControls"/>
+    <ds:schemaRef ds:uri="http://schemas.microsoft.com/sharepoint/v3"/>
+    <ds:schemaRef ds:uri="71af3243-3dd4-4a8d-8c0d-dd76da1f02a5"/>
+    <ds:schemaRef ds:uri="230e9df3-be65-4c73-a93b-d1236ebd677e"/>
   </ds:schemaRefs>
 </ds:datastoreItem>
 </file>
@@ -15238,13 +16121,9 @@
 </file>
 
 <file path=customXml/itemProps3.xml><?xml version="1.0" encoding="utf-8"?>
-<ds:datastoreItem xmlns:ds="http://schemas.openxmlformats.org/officeDocument/2006/customXml" ds:itemID="{61D9A46C-D3F3-4D45-B248-B831C6B5FC85}">
+<ds:datastoreItem xmlns:ds="http://schemas.openxmlformats.org/officeDocument/2006/customXml" ds:itemID="{5FA78568-A730-4D3B-A489-FD854E91254A}">
   <ds:schemaRefs>
-    <ds:schemaRef ds:uri="http://schemas.microsoft.com/office/2006/metadata/properties"/>
-    <ds:schemaRef ds:uri="http://schemas.microsoft.com/office/infopath/2007/PartnerControls"/>
-    <ds:schemaRef ds:uri="http://schemas.microsoft.com/sharepoint/v3"/>
-    <ds:schemaRef ds:uri="71af3243-3dd4-4a8d-8c0d-dd76da1f02a5"/>
-    <ds:schemaRef ds:uri="230e9df3-be65-4c73-a93b-d1236ebd677e"/>
+    <ds:schemaRef ds:uri="http://schemas.microsoft.com/sharepoint/v3/contenttype/forms"/>
   </ds:schemaRefs>
 </ds:datastoreItem>
 </file>

</xml_diff>